<commit_message>
MyEdgeDetector-- draw lines, draw LineIterators and pickup pixel values under lines, draw straight line (nased on pt1.x = pt2,x)= this gives number of pixels inside object.
</commit_message>
<xml_diff>
--- a/ConsoleApplication5/20170118_POA.pptx
+++ b/ConsoleApplication5/20170118_POA.pptx
@@ -10,6 +10,7 @@
     <p:sldId id="258" r:id="rId4"/>
     <p:sldId id="259" r:id="rId5"/>
     <p:sldId id="260" r:id="rId6"/>
+    <p:sldId id="261" r:id="rId7"/>
   </p:sldIdLst>
   <p:sldSz cx="9144000" cy="6858000" type="screen4x3"/>
   <p:notesSz cx="6858000" cy="9144000"/>
@@ -3203,21 +3204,46 @@
           <a:bodyPr/>
           <a:lstStyle/>
           <a:p>
+            <a:pPr marL="514350" indent="-514350">
+              <a:buFont typeface="+mj-lt"/>
+              <a:buAutoNum type="arabicPeriod"/>
+            </a:pPr>
             <a:r>
               <a:rPr lang="en-ZA" dirty="0" smtClean="0"/>
               <a:t>Find components</a:t>
             </a:r>
           </a:p>
           <a:p>
-            <a:r>
-              <a:rPr lang="en-ZA" dirty="0" smtClean="0"/>
-              <a:t>Is found components ripples?</a:t>
-            </a:r>
-          </a:p>
-          <a:p>
-            <a:r>
-              <a:rPr lang="en-ZA" dirty="0" smtClean="0"/>
-              <a:t>What is the orientation of found ripples?</a:t>
+            <a:pPr marL="514350" indent="-514350">
+              <a:buFont typeface="+mj-lt"/>
+              <a:buAutoNum type="arabicPeriod"/>
+            </a:pPr>
+            <a:r>
+              <a:rPr lang="en-ZA" dirty="0" smtClean="0"/>
+              <a:t>Is found components ripples</a:t>
+            </a:r>
+            <a:r>
+              <a:rPr lang="en-ZA" dirty="0" smtClean="0"/>
+              <a:t>? [profiling]</a:t>
+            </a:r>
+            <a:endParaRPr lang="en-ZA" dirty="0" smtClean="0"/>
+          </a:p>
+          <a:p>
+            <a:pPr marL="514350" indent="-514350">
+              <a:buFont typeface="+mj-lt"/>
+              <a:buAutoNum type="arabicPeriod"/>
+            </a:pPr>
+            <a:r>
+              <a:rPr lang="en-ZA" dirty="0" smtClean="0"/>
+              <a:t>What is the orientation of found </a:t>
+            </a:r>
+            <a:r>
+              <a:rPr lang="en-ZA" dirty="0" smtClean="0"/>
+              <a:t>components? </a:t>
+            </a:r>
+            <a:r>
+              <a:rPr lang="en-ZA" dirty="0" smtClean="0"/>
+              <a:t>A cluster of ripples has roughly the same angle [histogram analysis]</a:t>
             </a:r>
             <a:endParaRPr lang="en-ZA" dirty="0"/>
           </a:p>
@@ -3270,7 +3296,11 @@
           <a:p>
             <a:r>
               <a:rPr lang="en-ZA" dirty="0" smtClean="0"/>
-              <a:t>Find components</a:t>
+              <a:t>(1) Find </a:t>
+            </a:r>
+            <a:r>
+              <a:rPr lang="en-ZA" dirty="0" smtClean="0"/>
+              <a:t>components</a:t>
             </a:r>
             <a:endParaRPr lang="en-ZA" dirty="0"/>
           </a:p>
@@ -3374,7 +3404,11 @@
           <a:p>
             <a:r>
               <a:rPr lang="en-ZA" dirty="0" smtClean="0"/>
-              <a:t>Is found components ripples?</a:t>
+              <a:t>(2) Is </a:t>
+            </a:r>
+            <a:r>
+              <a:rPr lang="en-ZA" dirty="0" smtClean="0"/>
+              <a:t>found components ripples?</a:t>
             </a:r>
             <a:br>
               <a:rPr lang="en-ZA" dirty="0" smtClean="0"/>
@@ -3396,7 +3430,7 @@
         <p:spPr/>
         <p:txBody>
           <a:bodyPr>
-            <a:normAutofit lnSpcReduction="10000"/>
+            <a:normAutofit fontScale="92500" lnSpcReduction="10000"/>
           </a:bodyPr>
           <a:lstStyle/>
           <a:p>
@@ -3430,8 +3464,27 @@
             <a:pPr lvl="2"/>
             <a:r>
               <a:rPr lang="en-ZA" dirty="0" smtClean="0"/>
-              <a:t>Plot profiles and compare them</a:t>
-            </a:r>
+              <a:t>Plot profiles and compare </a:t>
+            </a:r>
+            <a:r>
+              <a:rPr lang="en-ZA" dirty="0" smtClean="0"/>
+              <a:t>them</a:t>
+            </a:r>
+          </a:p>
+          <a:p>
+            <a:pPr lvl="3"/>
+            <a:r>
+              <a:rPr lang="en-ZA" dirty="0" smtClean="0"/>
+              <a:t>Will see the shape of component</a:t>
+            </a:r>
+          </a:p>
+          <a:p>
+            <a:pPr lvl="4"/>
+            <a:r>
+              <a:rPr lang="en-ZA" dirty="0" smtClean="0"/>
+              <a:t>Tapers down at the ends with bulge in middle</a:t>
+            </a:r>
+            <a:endParaRPr lang="en-ZA" dirty="0" smtClean="0"/>
           </a:p>
           <a:p>
             <a:pPr lvl="2"/>
@@ -3513,7 +3566,15 @@
           <a:p>
             <a:r>
               <a:rPr lang="en-ZA" dirty="0" smtClean="0"/>
-              <a:t>What is the orientation of found ripples?</a:t>
+              <a:t>(3) What </a:t>
+            </a:r>
+            <a:r>
+              <a:rPr lang="en-ZA" dirty="0" smtClean="0"/>
+              <a:t>is the orientation of found </a:t>
+            </a:r>
+            <a:r>
+              <a:rPr lang="en-ZA" dirty="0" smtClean="0"/>
+              <a:t>components?</a:t>
             </a:r>
             <a:endParaRPr lang="en-ZA" dirty="0"/>
           </a:p>
@@ -3538,7 +3599,15 @@
           <a:p>
             <a:r>
               <a:rPr lang="en-ZA" dirty="0" smtClean="0"/>
-              <a:t>Once ripple is found:</a:t>
+              <a:t>Once </a:t>
+            </a:r>
+            <a:r>
+              <a:rPr lang="en-ZA" dirty="0" smtClean="0"/>
+              <a:t>component is </a:t>
+            </a:r>
+            <a:r>
+              <a:rPr lang="en-ZA" dirty="0" smtClean="0"/>
+              <a:t>found:</a:t>
             </a:r>
           </a:p>
           <a:p>
@@ -3579,9 +3648,16 @@
             </a:pPr>
             <a:r>
               <a:rPr lang="en-ZA" dirty="0" smtClean="0"/>
-              <a:t>Find centre of bin – this is dominant angle – angle of bin – angel of all the pixels inside bin</a:t>
-            </a:r>
-            <a:endParaRPr lang="en-ZA" dirty="0" smtClean="0"/>
+              <a:t>Find centre of bin – this is dominant angle – angle of bin – </a:t>
+            </a:r>
+            <a:r>
+              <a:rPr lang="en-ZA" dirty="0" smtClean="0"/>
+              <a:t>angle </a:t>
+            </a:r>
+            <a:r>
+              <a:rPr lang="en-ZA" dirty="0" smtClean="0"/>
+              <a:t>of all the pixels inside bin</a:t>
+            </a:r>
           </a:p>
           <a:p>
             <a:pPr marL="1371600" lvl="2" indent="-457200">
@@ -3600,7 +3676,15 @@
             </a:pPr>
             <a:r>
               <a:rPr lang="en-ZA" dirty="0" smtClean="0"/>
-              <a:t>Does plotted coloured pixels give ripple’s entire edge?</a:t>
+              <a:t>Does plotted coloured pixels give </a:t>
+            </a:r>
+            <a:r>
+              <a:rPr lang="en-ZA" dirty="0" smtClean="0"/>
+              <a:t>components entire </a:t>
+            </a:r>
+            <a:r>
+              <a:rPr lang="en-ZA" dirty="0" smtClean="0"/>
+              <a:t>edge?</a:t>
             </a:r>
           </a:p>
           <a:p>
@@ -3620,7 +3704,15 @@
             </a:pPr>
             <a:r>
               <a:rPr lang="en-ZA" dirty="0" smtClean="0"/>
-              <a:t>If yes, this bin’s orientation is  discovered dominant angle</a:t>
+              <a:t>If yes, this bin’s orientation is  </a:t>
+            </a:r>
+            <a:r>
+              <a:rPr lang="en-ZA" dirty="0" smtClean="0"/>
+              <a:t>the discovered </a:t>
+            </a:r>
+            <a:r>
+              <a:rPr lang="en-ZA" dirty="0" smtClean="0"/>
+              <a:t>dominant angle</a:t>
             </a:r>
           </a:p>
           <a:p>
@@ -3643,6 +3735,139 @@
     <p:extLst>
       <p:ext uri="{BB962C8B-B14F-4D97-AF65-F5344CB8AC3E}">
         <p14:creationId xmlns:p14="http://schemas.microsoft.com/office/powerpoint/2010/main" val="4291895190"/>
+      </p:ext>
+    </p:extLst>
+  </p:cSld>
+  <p:clrMapOvr>
+    <a:masterClrMapping/>
+  </p:clrMapOvr>
+</p:sld>
+</file>
+
+<file path=ppt/slides/slide6.xml><?xml version="1.0" encoding="utf-8"?>
+<p:sld xmlns:a="http://schemas.openxmlformats.org/drawingml/2006/main" xmlns:r="http://schemas.openxmlformats.org/officeDocument/2006/relationships" xmlns:p="http://schemas.openxmlformats.org/presentationml/2006/main">
+  <p:cSld>
+    <p:spTree>
+      <p:nvGrpSpPr>
+        <p:cNvPr id="1" name=""/>
+        <p:cNvGrpSpPr/>
+        <p:nvPr/>
+      </p:nvGrpSpPr>
+      <p:grpSpPr>
+        <a:xfrm>
+          <a:off x="0" y="0"/>
+          <a:ext cx="0" cy="0"/>
+          <a:chOff x="0" y="0"/>
+          <a:chExt cx="0" cy="0"/>
+        </a:xfrm>
+      </p:grpSpPr>
+      <p:sp>
+        <p:nvSpPr>
+          <p:cNvPr id="2" name="Title 1"/>
+          <p:cNvSpPr>
+            <a:spLocks noGrp="1"/>
+          </p:cNvSpPr>
+          <p:nvPr>
+            <p:ph type="title"/>
+          </p:nvPr>
+        </p:nvSpPr>
+        <p:spPr/>
+        <p:txBody>
+          <a:bodyPr/>
+          <a:lstStyle/>
+          <a:p>
+            <a:endParaRPr lang="en-ZA"/>
+          </a:p>
+        </p:txBody>
+      </p:sp>
+      <p:sp>
+        <p:nvSpPr>
+          <p:cNvPr id="3" name="Content Placeholder 2"/>
+          <p:cNvSpPr>
+            <a:spLocks noGrp="1"/>
+          </p:cNvSpPr>
+          <p:nvPr>
+            <p:ph idx="1"/>
+          </p:nvPr>
+        </p:nvSpPr>
+        <p:spPr/>
+        <p:txBody>
+          <a:bodyPr>
+            <a:normAutofit lnSpcReduction="10000"/>
+          </a:bodyPr>
+          <a:lstStyle/>
+          <a:p>
+            <a:r>
+              <a:rPr lang="en-ZA" dirty="0" smtClean="0"/>
+              <a:t>For (each component)</a:t>
+            </a:r>
+          </a:p>
+          <a:p>
+            <a:pPr lvl="1"/>
+            <a:r>
+              <a:rPr lang="en-ZA" dirty="0" smtClean="0"/>
+              <a:t>Profile component</a:t>
+            </a:r>
+          </a:p>
+          <a:p>
+            <a:pPr lvl="2"/>
+            <a:r>
+              <a:rPr lang="en-ZA" dirty="0" smtClean="0"/>
+              <a:t>Generate profiles of component</a:t>
+            </a:r>
+          </a:p>
+          <a:p>
+            <a:pPr lvl="2"/>
+            <a:r>
+              <a:rPr lang="en-ZA" dirty="0" smtClean="0"/>
+              <a:t>Does component have ripple shape?</a:t>
+            </a:r>
+          </a:p>
+          <a:p>
+            <a:pPr lvl="3"/>
+            <a:r>
+              <a:rPr lang="en-ZA" dirty="0" smtClean="0"/>
+              <a:t>Starting from one end of component, does number of component pixels increase as you move closer to centre of component, &amp; then starts tapering </a:t>
+            </a:r>
+            <a:r>
+              <a:rPr lang="en-ZA" smtClean="0"/>
+              <a:t>down again?</a:t>
+            </a:r>
+            <a:endParaRPr lang="en-ZA" dirty="0" smtClean="0"/>
+          </a:p>
+          <a:p>
+            <a:pPr lvl="1"/>
+            <a:r>
+              <a:rPr lang="en-ZA" dirty="0" smtClean="0"/>
+              <a:t>Histogram analyse component</a:t>
+            </a:r>
+          </a:p>
+          <a:p>
+            <a:pPr lvl="2"/>
+            <a:r>
+              <a:rPr lang="en-ZA" dirty="0" smtClean="0"/>
+              <a:t>Find component angle</a:t>
+            </a:r>
+          </a:p>
+          <a:p>
+            <a:pPr lvl="2"/>
+            <a:r>
+              <a:rPr lang="en-ZA" dirty="0" smtClean="0"/>
+              <a:t>Does component have angle similar to other components?</a:t>
+            </a:r>
+          </a:p>
+          <a:p>
+            <a:endParaRPr lang="en-ZA" dirty="0" smtClean="0"/>
+          </a:p>
+          <a:p>
+            <a:endParaRPr lang="en-ZA" dirty="0"/>
+          </a:p>
+        </p:txBody>
+      </p:sp>
+    </p:spTree>
+    <p:extLst>
+      <p:ext uri="{BB962C8B-B14F-4D97-AF65-F5344CB8AC3E}">
+        <p14:creationId xmlns:p14="http://schemas.microsoft.com/office/powerpoint/2010/main" val="1027214350"/>
       </p:ext>
     </p:extLst>
   </p:cSld>

</xml_diff>

<commit_message>
WIP: Storing all pixel related to bins in bins - example store all pixels (from Canny Image) that relate to bin 0-5. Do this for all bins. Once done, count pixels in each bin and find maximum. plot pixels that belong to maximum bin with colour. If colour plotted pixels make up entire component, then that maximum bin is components angle. DO THIS FOR ALL COMPONENTS
</commit_message>
<xml_diff>
--- a/ConsoleApplication5/20170118_POA.pptx
+++ b/ConsoleApplication5/20170118_POA.pptx
@@ -6,11 +6,12 @@
   </p:sldMasterIdLst>
   <p:sldIdLst>
     <p:sldId id="256" r:id="rId2"/>
-    <p:sldId id="257" r:id="rId3"/>
-    <p:sldId id="258" r:id="rId4"/>
-    <p:sldId id="259" r:id="rId5"/>
-    <p:sldId id="260" r:id="rId6"/>
-    <p:sldId id="261" r:id="rId7"/>
+    <p:sldId id="262" r:id="rId3"/>
+    <p:sldId id="257" r:id="rId4"/>
+    <p:sldId id="258" r:id="rId5"/>
+    <p:sldId id="259" r:id="rId6"/>
+    <p:sldId id="260" r:id="rId7"/>
+    <p:sldId id="261" r:id="rId8"/>
   </p:sldIdLst>
   <p:sldSz cx="9144000" cy="6858000" type="screen4x3"/>
   <p:notesSz cx="6858000" cy="9144000"/>
@@ -293,7 +294,7 @@
           <a:p>
             <a:fld id="{F336AD1D-019F-4E13-8E2B-E0830EF1CB0D}" type="datetimeFigureOut">
               <a:rPr lang="en-ZA" smtClean="0"/>
-              <a:t>2017/01/18</a:t>
+              <a:t>2017/01/21</a:t>
             </a:fld>
             <a:endParaRPr lang="en-ZA"/>
           </a:p>
@@ -463,7 +464,7 @@
           <a:p>
             <a:fld id="{F336AD1D-019F-4E13-8E2B-E0830EF1CB0D}" type="datetimeFigureOut">
               <a:rPr lang="en-ZA" smtClean="0"/>
-              <a:t>2017/01/18</a:t>
+              <a:t>2017/01/21</a:t>
             </a:fld>
             <a:endParaRPr lang="en-ZA"/>
           </a:p>
@@ -643,7 +644,7 @@
           <a:p>
             <a:fld id="{F336AD1D-019F-4E13-8E2B-E0830EF1CB0D}" type="datetimeFigureOut">
               <a:rPr lang="en-ZA" smtClean="0"/>
-              <a:t>2017/01/18</a:t>
+              <a:t>2017/01/21</a:t>
             </a:fld>
             <a:endParaRPr lang="en-ZA"/>
           </a:p>
@@ -813,7 +814,7 @@
           <a:p>
             <a:fld id="{F336AD1D-019F-4E13-8E2B-E0830EF1CB0D}" type="datetimeFigureOut">
               <a:rPr lang="en-ZA" smtClean="0"/>
-              <a:t>2017/01/18</a:t>
+              <a:t>2017/01/21</a:t>
             </a:fld>
             <a:endParaRPr lang="en-ZA"/>
           </a:p>
@@ -1059,7 +1060,7 @@
           <a:p>
             <a:fld id="{F336AD1D-019F-4E13-8E2B-E0830EF1CB0D}" type="datetimeFigureOut">
               <a:rPr lang="en-ZA" smtClean="0"/>
-              <a:t>2017/01/18</a:t>
+              <a:t>2017/01/21</a:t>
             </a:fld>
             <a:endParaRPr lang="en-ZA"/>
           </a:p>
@@ -1347,7 +1348,7 @@
           <a:p>
             <a:fld id="{F336AD1D-019F-4E13-8E2B-E0830EF1CB0D}" type="datetimeFigureOut">
               <a:rPr lang="en-ZA" smtClean="0"/>
-              <a:t>2017/01/18</a:t>
+              <a:t>2017/01/21</a:t>
             </a:fld>
             <a:endParaRPr lang="en-ZA"/>
           </a:p>
@@ -1769,7 +1770,7 @@
           <a:p>
             <a:fld id="{F336AD1D-019F-4E13-8E2B-E0830EF1CB0D}" type="datetimeFigureOut">
               <a:rPr lang="en-ZA" smtClean="0"/>
-              <a:t>2017/01/18</a:t>
+              <a:t>2017/01/21</a:t>
             </a:fld>
             <a:endParaRPr lang="en-ZA"/>
           </a:p>
@@ -1887,7 +1888,7 @@
           <a:p>
             <a:fld id="{F336AD1D-019F-4E13-8E2B-E0830EF1CB0D}" type="datetimeFigureOut">
               <a:rPr lang="en-ZA" smtClean="0"/>
-              <a:t>2017/01/18</a:t>
+              <a:t>2017/01/21</a:t>
             </a:fld>
             <a:endParaRPr lang="en-ZA"/>
           </a:p>
@@ -1982,7 +1983,7 @@
           <a:p>
             <a:fld id="{F336AD1D-019F-4E13-8E2B-E0830EF1CB0D}" type="datetimeFigureOut">
               <a:rPr lang="en-ZA" smtClean="0"/>
-              <a:t>2017/01/18</a:t>
+              <a:t>2017/01/21</a:t>
             </a:fld>
             <a:endParaRPr lang="en-ZA"/>
           </a:p>
@@ -2259,7 +2260,7 @@
           <a:p>
             <a:fld id="{F336AD1D-019F-4E13-8E2B-E0830EF1CB0D}" type="datetimeFigureOut">
               <a:rPr lang="en-ZA" smtClean="0"/>
-              <a:t>2017/01/18</a:t>
+              <a:t>2017/01/21</a:t>
             </a:fld>
             <a:endParaRPr lang="en-ZA"/>
           </a:p>
@@ -2512,7 +2513,7 @@
           <a:p>
             <a:fld id="{F336AD1D-019F-4E13-8E2B-E0830EF1CB0D}" type="datetimeFigureOut">
               <a:rPr lang="en-ZA" smtClean="0"/>
-              <a:t>2017/01/18</a:t>
+              <a:t>2017/01/21</a:t>
             </a:fld>
             <a:endParaRPr lang="en-ZA"/>
           </a:p>
@@ -2725,7 +2726,7 @@
           <a:p>
             <a:fld id="{F336AD1D-019F-4E13-8E2B-E0830EF1CB0D}" type="datetimeFigureOut">
               <a:rPr lang="en-ZA" smtClean="0"/>
-              <a:t>2017/01/18</a:t>
+              <a:t>2017/01/21</a:t>
             </a:fld>
             <a:endParaRPr lang="en-ZA"/>
           </a:p>
@@ -3148,6 +3149,13 @@
   <p:clrMapOvr>
     <a:masterClrMapping/>
   </p:clrMapOvr>
+  <p:timing>
+    <p:tnLst>
+      <p:par>
+        <p:cTn id="1" dur="indefinite" restart="never" nodeType="tmRoot"/>
+      </p:par>
+    </p:tnLst>
+  </p:timing>
 </p:sld>
 </file>
 
@@ -3180,85 +3188,59 @@
         </p:nvSpPr>
         <p:spPr/>
         <p:txBody>
-          <a:bodyPr>
-            <a:normAutofit/>
-          </a:bodyPr>
-          <a:lstStyle/>
-          <a:p>
-            <a:endParaRPr lang="en-ZA" dirty="0"/>
-          </a:p>
-        </p:txBody>
-      </p:sp>
-      <p:sp>
-        <p:nvSpPr>
-          <p:cNvPr id="3" name="Content Placeholder 2"/>
-          <p:cNvSpPr>
-            <a:spLocks noGrp="1"/>
-          </p:cNvSpPr>
+          <a:bodyPr/>
+          <a:lstStyle/>
+          <a:p>
+            <a:endParaRPr lang="en-ZA"/>
+          </a:p>
+        </p:txBody>
+      </p:sp>
+      <p:pic>
+        <p:nvPicPr>
+          <p:cNvPr id="4" name="Content Placeholder 3"/>
+          <p:cNvPicPr>
+            <a:picLocks noGrp="1" noChangeAspect="1"/>
+          </p:cNvPicPr>
           <p:nvPr>
             <p:ph idx="1"/>
           </p:nvPr>
-        </p:nvSpPr>
-        <p:spPr/>
-        <p:txBody>
-          <a:bodyPr/>
-          <a:lstStyle/>
-          <a:p>
-            <a:pPr marL="514350" indent="-514350">
-              <a:buFont typeface="+mj-lt"/>
-              <a:buAutoNum type="arabicPeriod"/>
-            </a:pPr>
-            <a:r>
-              <a:rPr lang="en-ZA" dirty="0" smtClean="0"/>
-              <a:t>Find components</a:t>
-            </a:r>
-          </a:p>
-          <a:p>
-            <a:pPr marL="514350" indent="-514350">
-              <a:buFont typeface="+mj-lt"/>
-              <a:buAutoNum type="arabicPeriod"/>
-            </a:pPr>
-            <a:r>
-              <a:rPr lang="en-ZA" dirty="0" smtClean="0"/>
-              <a:t>Is found components ripples</a:t>
-            </a:r>
-            <a:r>
-              <a:rPr lang="en-ZA" dirty="0" smtClean="0"/>
-              <a:t>? [profiling]</a:t>
-            </a:r>
-            <a:endParaRPr lang="en-ZA" dirty="0" smtClean="0"/>
-          </a:p>
-          <a:p>
-            <a:pPr marL="514350" indent="-514350">
-              <a:buFont typeface="+mj-lt"/>
-              <a:buAutoNum type="arabicPeriod"/>
-            </a:pPr>
-            <a:r>
-              <a:rPr lang="en-ZA" dirty="0" smtClean="0"/>
-              <a:t>What is the orientation of found </a:t>
-            </a:r>
-            <a:r>
-              <a:rPr lang="en-ZA" dirty="0" smtClean="0"/>
-              <a:t>components? </a:t>
-            </a:r>
-            <a:r>
-              <a:rPr lang="en-ZA" dirty="0" smtClean="0"/>
-              <a:t>A cluster of ripples has roughly the same angle [histogram analysis]</a:t>
-            </a:r>
-            <a:endParaRPr lang="en-ZA" dirty="0"/>
-          </a:p>
-        </p:txBody>
-      </p:sp>
+        </p:nvPicPr>
+        <p:blipFill>
+          <a:blip r:embed="rId2" cstate="print">
+            <a:extLst>
+              <a:ext uri="{28A0092B-C50C-407E-A947-70E740481C1C}">
+                <a14:useLocalDpi xmlns:a14="http://schemas.microsoft.com/office/drawing/2010/main" val="0"/>
+              </a:ext>
+            </a:extLst>
+          </a:blip>
+          <a:stretch>
+            <a:fillRect/>
+          </a:stretch>
+        </p:blipFill>
+        <p:spPr>
+          <a:xfrm>
+            <a:off x="-13855" y="-20782"/>
+            <a:ext cx="9171709" cy="6878782"/>
+          </a:xfrm>
+        </p:spPr>
+      </p:pic>
     </p:spTree>
     <p:extLst>
       <p:ext uri="{BB962C8B-B14F-4D97-AF65-F5344CB8AC3E}">
-        <p14:creationId xmlns:p14="http://schemas.microsoft.com/office/powerpoint/2010/main" val="2218862039"/>
+        <p14:creationId xmlns:p14="http://schemas.microsoft.com/office/powerpoint/2010/main" val="969448167"/>
       </p:ext>
     </p:extLst>
   </p:cSld>
   <p:clrMapOvr>
     <a:masterClrMapping/>
   </p:clrMapOvr>
+  <p:timing>
+    <p:tnLst>
+      <p:par>
+        <p:cTn id="1" dur="indefinite" restart="never" nodeType="tmRoot"/>
+      </p:par>
+    </p:tnLst>
+  </p:timing>
 </p:sld>
 </file>
 
@@ -3291,65 +3273,57 @@
         </p:nvSpPr>
         <p:spPr/>
         <p:txBody>
-          <a:bodyPr/>
-          <a:lstStyle/>
-          <a:p>
+          <a:bodyPr>
+            <a:normAutofit/>
+          </a:bodyPr>
+          <a:lstStyle/>
+          <a:p>
+            <a:endParaRPr lang="en-ZA" dirty="0"/>
+          </a:p>
+        </p:txBody>
+      </p:sp>
+      <p:sp>
+        <p:nvSpPr>
+          <p:cNvPr id="3" name="Content Placeholder 2"/>
+          <p:cNvSpPr>
+            <a:spLocks noGrp="1"/>
+          </p:cNvSpPr>
+          <p:nvPr>
+            <p:ph idx="1"/>
+          </p:nvPr>
+        </p:nvSpPr>
+        <p:spPr/>
+        <p:txBody>
+          <a:bodyPr/>
+          <a:lstStyle/>
+          <a:p>
+            <a:pPr marL="514350" indent="-514350">
+              <a:buFont typeface="+mj-lt"/>
+              <a:buAutoNum type="arabicPeriod"/>
+            </a:pPr>
             <a:r>
               <a:rPr lang="en-ZA" dirty="0" smtClean="0"/>
-              <a:t>(1) Find </a:t>
-            </a:r>
+              <a:t>Find components</a:t>
+            </a:r>
+          </a:p>
+          <a:p>
+            <a:pPr marL="514350" indent="-514350">
+              <a:buFont typeface="+mj-lt"/>
+              <a:buAutoNum type="arabicPeriod"/>
+            </a:pPr>
             <a:r>
               <a:rPr lang="en-ZA" dirty="0" smtClean="0"/>
-              <a:t>components</a:t>
-            </a:r>
-            <a:endParaRPr lang="en-ZA" dirty="0"/>
-          </a:p>
-        </p:txBody>
-      </p:sp>
-      <p:sp>
-        <p:nvSpPr>
-          <p:cNvPr id="3" name="Content Placeholder 2"/>
-          <p:cNvSpPr>
-            <a:spLocks noGrp="1"/>
-          </p:cNvSpPr>
-          <p:nvPr>
-            <p:ph idx="1"/>
-          </p:nvPr>
-        </p:nvSpPr>
-        <p:spPr/>
-        <p:txBody>
-          <a:bodyPr/>
-          <a:lstStyle/>
-          <a:p>
+              <a:t>Is found components ripples? [profiling]</a:t>
+            </a:r>
+          </a:p>
+          <a:p>
+            <a:pPr marL="514350" indent="-514350">
+              <a:buFont typeface="+mj-lt"/>
+              <a:buAutoNum type="arabicPeriod"/>
+            </a:pPr>
             <a:r>
               <a:rPr lang="en-ZA" dirty="0" smtClean="0"/>
-              <a:t>OPENCV </a:t>
-            </a:r>
-            <a:r>
-              <a:rPr lang="en-ZA" dirty="0" err="1" smtClean="0"/>
-              <a:t>connectedComponents</a:t>
-            </a:r>
-            <a:endParaRPr lang="en-ZA" dirty="0" smtClean="0"/>
-          </a:p>
-          <a:p>
-            <a:pPr lvl="1"/>
-            <a:r>
-              <a:rPr lang="en-ZA" dirty="0" smtClean="0"/>
-              <a:t>Find all components (of shadows)</a:t>
-            </a:r>
-          </a:p>
-          <a:p>
-            <a:pPr lvl="1"/>
-            <a:r>
-              <a:rPr lang="en-ZA" dirty="0" smtClean="0"/>
-              <a:t>Each component</a:t>
-            </a:r>
-          </a:p>
-          <a:p>
-            <a:pPr lvl="2"/>
-            <a:r>
-              <a:rPr lang="en-ZA" dirty="0" smtClean="0"/>
-              <a:t>drawings</a:t>
+              <a:t>What is the orientation of found components? A cluster of ripples has roughly the same angle [histogram analysis]</a:t>
             </a:r>
             <a:endParaRPr lang="en-ZA" dirty="0"/>
           </a:p>
@@ -3358,13 +3332,20 @@
     </p:spTree>
     <p:extLst>
       <p:ext uri="{BB962C8B-B14F-4D97-AF65-F5344CB8AC3E}">
-        <p14:creationId xmlns:p14="http://schemas.microsoft.com/office/powerpoint/2010/main" val="285883193"/>
+        <p14:creationId xmlns:p14="http://schemas.microsoft.com/office/powerpoint/2010/main" val="2218862039"/>
       </p:ext>
     </p:extLst>
   </p:cSld>
   <p:clrMapOvr>
     <a:masterClrMapping/>
   </p:clrMapOvr>
+  <p:timing>
+    <p:tnLst>
+      <p:par>
+        <p:cTn id="1" dur="indefinite" restart="never" nodeType="tmRoot"/>
+      </p:par>
+    </p:tnLst>
+  </p:timing>
 </p:sld>
 </file>
 
@@ -3397,121 +3378,65 @@
         </p:nvSpPr>
         <p:spPr/>
         <p:txBody>
-          <a:bodyPr>
-            <a:normAutofit fontScale="90000"/>
-          </a:bodyPr>
+          <a:bodyPr/>
           <a:lstStyle/>
           <a:p>
             <a:r>
               <a:rPr lang="en-ZA" dirty="0" smtClean="0"/>
-              <a:t>(2) Is </a:t>
-            </a:r>
+              <a:t>(1) Find components</a:t>
+            </a:r>
+            <a:endParaRPr lang="en-ZA" dirty="0"/>
+          </a:p>
+        </p:txBody>
+      </p:sp>
+      <p:sp>
+        <p:nvSpPr>
+          <p:cNvPr id="3" name="Content Placeholder 2"/>
+          <p:cNvSpPr>
+            <a:spLocks noGrp="1"/>
+          </p:cNvSpPr>
+          <p:nvPr>
+            <p:ph idx="1"/>
+          </p:nvPr>
+        </p:nvSpPr>
+        <p:spPr/>
+        <p:txBody>
+          <a:bodyPr/>
+          <a:lstStyle/>
+          <a:p>
             <a:r>
               <a:rPr lang="en-ZA" dirty="0" smtClean="0"/>
-              <a:t>found components ripples?</a:t>
-            </a:r>
-            <a:br>
+              <a:t>OPENCV </a:t>
+            </a:r>
+            <a:r>
+              <a:rPr lang="en-ZA" dirty="0" err="1" smtClean="0"/>
+              <a:t>connectedComponents</a:t>
+            </a:r>
+            <a:endParaRPr lang="en-ZA" dirty="0" smtClean="0"/>
+          </a:p>
+          <a:p>
+            <a:pPr lvl="1"/>
+            <a:r>
               <a:rPr lang="en-ZA" dirty="0" smtClean="0"/>
-            </a:br>
-            <a:endParaRPr lang="en-ZA" dirty="0"/>
-          </a:p>
-        </p:txBody>
-      </p:sp>
-      <p:sp>
-        <p:nvSpPr>
-          <p:cNvPr id="3" name="Content Placeholder 2"/>
-          <p:cNvSpPr>
-            <a:spLocks noGrp="1"/>
-          </p:cNvSpPr>
-          <p:nvPr>
-            <p:ph idx="1"/>
-          </p:nvPr>
-        </p:nvSpPr>
-        <p:spPr/>
-        <p:txBody>
-          <a:bodyPr>
-            <a:normAutofit fontScale="92500" lnSpcReduction="10000"/>
-          </a:bodyPr>
-          <a:lstStyle/>
-          <a:p>
+              <a:t>Find all components (of shadows)</a:t>
+            </a:r>
+          </a:p>
+          <a:p>
+            <a:pPr lvl="1"/>
             <a:r>
               <a:rPr lang="en-ZA" dirty="0" smtClean="0"/>
-              <a:t>Get profiles of each component</a:t>
-            </a:r>
-          </a:p>
-          <a:p>
-            <a:pPr lvl="1"/>
+              <a:t>Each component</a:t>
+            </a:r>
+          </a:p>
+          <a:p>
+            <a:pPr lvl="2"/>
             <a:r>
               <a:rPr lang="en-ZA" dirty="0" smtClean="0"/>
-              <a:t>Draw lines (profile lines)</a:t>
-            </a:r>
-          </a:p>
-          <a:p>
-            <a:pPr lvl="1"/>
-            <a:r>
-              <a:rPr lang="en-ZA" dirty="0" smtClean="0"/>
-              <a:t>Get component pixels under profile lines</a:t>
-            </a:r>
-          </a:p>
-          <a:p>
-            <a:pPr lvl="1"/>
-            <a:r>
-              <a:rPr lang="en-ZA" dirty="0" smtClean="0"/>
-              <a:t>Rules to inspect profiles:</a:t>
-            </a:r>
-          </a:p>
-          <a:p>
-            <a:pPr lvl="2"/>
-            <a:r>
-              <a:rPr lang="en-ZA" dirty="0" smtClean="0"/>
-              <a:t>Plot profiles and compare </a:t>
-            </a:r>
-            <a:r>
-              <a:rPr lang="en-ZA" dirty="0" smtClean="0"/>
-              <a:t>them</a:t>
-            </a:r>
-          </a:p>
-          <a:p>
-            <a:pPr lvl="3"/>
-            <a:r>
-              <a:rPr lang="en-ZA" dirty="0" smtClean="0"/>
-              <a:t>Will see the shape of component</a:t>
-            </a:r>
-          </a:p>
-          <a:p>
-            <a:pPr lvl="4"/>
-            <a:r>
-              <a:rPr lang="en-ZA" dirty="0" smtClean="0"/>
-              <a:t>Tapers down at the ends with bulge in middle</a:t>
-            </a:r>
-            <a:endParaRPr lang="en-ZA" dirty="0" smtClean="0"/>
-          </a:p>
-          <a:p>
-            <a:pPr lvl="2"/>
-            <a:r>
-              <a:rPr lang="en-ZA" dirty="0" smtClean="0"/>
-              <a:t>find average profile</a:t>
-            </a:r>
-          </a:p>
-          <a:p>
-            <a:pPr lvl="3"/>
-            <a:r>
-              <a:rPr lang="en-ZA" dirty="0" smtClean="0"/>
-              <a:t>will suppress noise &amp;</a:t>
-            </a:r>
-          </a:p>
-          <a:p>
-            <a:pPr lvl="3"/>
-            <a:r>
-              <a:rPr lang="en-ZA" dirty="0" smtClean="0"/>
-              <a:t>emphasize bulge</a:t>
-            </a:r>
-          </a:p>
-          <a:p>
-            <a:pPr lvl="1"/>
-            <a:r>
-              <a:rPr lang="en-ZA" dirty="0" smtClean="0"/>
-              <a:t>Rules must help reject or accept component as ripple</a:t>
+              <a:t>Known as drawings/masks </a:t>
+            </a:r>
+            <a:r>
+              <a:rPr lang="en-ZA" smtClean="0"/>
+              <a:t>in source code</a:t>
             </a:r>
             <a:endParaRPr lang="en-ZA" dirty="0"/>
           </a:p>
@@ -3520,13 +3445,20 @@
     </p:spTree>
     <p:extLst>
       <p:ext uri="{BB962C8B-B14F-4D97-AF65-F5344CB8AC3E}">
-        <p14:creationId xmlns:p14="http://schemas.microsoft.com/office/powerpoint/2010/main" val="534296273"/>
+        <p14:creationId xmlns:p14="http://schemas.microsoft.com/office/powerpoint/2010/main" val="285883193"/>
       </p:ext>
     </p:extLst>
   </p:cSld>
   <p:clrMapOvr>
     <a:masterClrMapping/>
   </p:clrMapOvr>
+  <p:timing>
+    <p:tnLst>
+      <p:par>
+        <p:cTn id="1" dur="indefinite" restart="never" nodeType="tmRoot"/>
+      </p:par>
+    </p:tnLst>
+  </p:timing>
 </p:sld>
 </file>
 
@@ -3566,15 +3498,160 @@
           <a:p>
             <a:r>
               <a:rPr lang="en-ZA" dirty="0" smtClean="0"/>
-              <a:t>(3) What </a:t>
-            </a:r>
-            <a:r>
+              <a:t>(2) Is found components ripples?</a:t>
+            </a:r>
+            <a:br>
               <a:rPr lang="en-ZA" dirty="0" smtClean="0"/>
-              <a:t>is the orientation of found </a:t>
-            </a:r>
+            </a:br>
+            <a:endParaRPr lang="en-ZA" dirty="0"/>
+          </a:p>
+        </p:txBody>
+      </p:sp>
+      <p:sp>
+        <p:nvSpPr>
+          <p:cNvPr id="3" name="Content Placeholder 2"/>
+          <p:cNvSpPr>
+            <a:spLocks noGrp="1"/>
+          </p:cNvSpPr>
+          <p:nvPr>
+            <p:ph idx="1"/>
+          </p:nvPr>
+        </p:nvSpPr>
+        <p:spPr/>
+        <p:txBody>
+          <a:bodyPr>
+            <a:normAutofit fontScale="92500" lnSpcReduction="10000"/>
+          </a:bodyPr>
+          <a:lstStyle/>
+          <a:p>
             <a:r>
               <a:rPr lang="en-ZA" dirty="0" smtClean="0"/>
-              <a:t>components?</a:t>
+              <a:t>Get profiles of each component</a:t>
+            </a:r>
+          </a:p>
+          <a:p>
+            <a:pPr lvl="1"/>
+            <a:r>
+              <a:rPr lang="en-ZA" dirty="0" smtClean="0"/>
+              <a:t>Draw lines (profile lines)</a:t>
+            </a:r>
+          </a:p>
+          <a:p>
+            <a:pPr lvl="1"/>
+            <a:r>
+              <a:rPr lang="en-ZA" dirty="0" smtClean="0"/>
+              <a:t>Get component pixels under profile lines</a:t>
+            </a:r>
+          </a:p>
+          <a:p>
+            <a:pPr lvl="1"/>
+            <a:r>
+              <a:rPr lang="en-ZA" dirty="0" smtClean="0"/>
+              <a:t>Rules to inspect profiles:</a:t>
+            </a:r>
+          </a:p>
+          <a:p>
+            <a:pPr lvl="2"/>
+            <a:r>
+              <a:rPr lang="en-ZA" dirty="0" smtClean="0"/>
+              <a:t>Plot profiles and compare them</a:t>
+            </a:r>
+          </a:p>
+          <a:p>
+            <a:pPr lvl="3"/>
+            <a:r>
+              <a:rPr lang="en-ZA" dirty="0" smtClean="0"/>
+              <a:t>Will see the shape of component</a:t>
+            </a:r>
+          </a:p>
+          <a:p>
+            <a:pPr lvl="4"/>
+            <a:r>
+              <a:rPr lang="en-ZA" dirty="0" smtClean="0"/>
+              <a:t>Tapers down at the ends with bulge in middle</a:t>
+            </a:r>
+          </a:p>
+          <a:p>
+            <a:pPr lvl="2"/>
+            <a:r>
+              <a:rPr lang="en-ZA" dirty="0" smtClean="0"/>
+              <a:t>find average profile</a:t>
+            </a:r>
+          </a:p>
+          <a:p>
+            <a:pPr lvl="3"/>
+            <a:r>
+              <a:rPr lang="en-ZA" dirty="0" smtClean="0"/>
+              <a:t>will suppress noise &amp;</a:t>
+            </a:r>
+          </a:p>
+          <a:p>
+            <a:pPr lvl="3"/>
+            <a:r>
+              <a:rPr lang="en-ZA" dirty="0" smtClean="0"/>
+              <a:t>emphasize bulge</a:t>
+            </a:r>
+          </a:p>
+          <a:p>
+            <a:pPr lvl="1"/>
+            <a:r>
+              <a:rPr lang="en-ZA" dirty="0" smtClean="0"/>
+              <a:t>Rules must help reject or accept component as ripple</a:t>
+            </a:r>
+            <a:endParaRPr lang="en-ZA" dirty="0"/>
+          </a:p>
+        </p:txBody>
+      </p:sp>
+    </p:spTree>
+    <p:extLst>
+      <p:ext uri="{BB962C8B-B14F-4D97-AF65-F5344CB8AC3E}">
+        <p14:creationId xmlns:p14="http://schemas.microsoft.com/office/powerpoint/2010/main" val="534296273"/>
+      </p:ext>
+    </p:extLst>
+  </p:cSld>
+  <p:clrMapOvr>
+    <a:masterClrMapping/>
+  </p:clrMapOvr>
+</p:sld>
+</file>
+
+<file path=ppt/slides/slide6.xml><?xml version="1.0" encoding="utf-8"?>
+<p:sld xmlns:a="http://schemas.openxmlformats.org/drawingml/2006/main" xmlns:r="http://schemas.openxmlformats.org/officeDocument/2006/relationships" xmlns:p="http://schemas.openxmlformats.org/presentationml/2006/main">
+  <p:cSld>
+    <p:spTree>
+      <p:nvGrpSpPr>
+        <p:cNvPr id="1" name=""/>
+        <p:cNvGrpSpPr/>
+        <p:nvPr/>
+      </p:nvGrpSpPr>
+      <p:grpSpPr>
+        <a:xfrm>
+          <a:off x="0" y="0"/>
+          <a:ext cx="0" cy="0"/>
+          <a:chOff x="0" y="0"/>
+          <a:chExt cx="0" cy="0"/>
+        </a:xfrm>
+      </p:grpSpPr>
+      <p:sp>
+        <p:nvSpPr>
+          <p:cNvPr id="2" name="Title 1"/>
+          <p:cNvSpPr>
+            <a:spLocks noGrp="1"/>
+          </p:cNvSpPr>
+          <p:nvPr>
+            <p:ph type="title"/>
+          </p:nvPr>
+        </p:nvSpPr>
+        <p:spPr/>
+        <p:txBody>
+          <a:bodyPr>
+            <a:normAutofit fontScale="90000"/>
+          </a:bodyPr>
+          <a:lstStyle/>
+          <a:p>
+            <a:r>
+              <a:rPr lang="en-ZA" dirty="0" smtClean="0"/>
+              <a:t>(3) What is the orientation of found components?</a:t>
             </a:r>
             <a:endParaRPr lang="en-ZA" dirty="0"/>
           </a:p>
@@ -3599,15 +3676,7 @@
           <a:p>
             <a:r>
               <a:rPr lang="en-ZA" dirty="0" smtClean="0"/>
-              <a:t>Once </a:t>
-            </a:r>
-            <a:r>
-              <a:rPr lang="en-ZA" dirty="0" smtClean="0"/>
-              <a:t>component is </a:t>
-            </a:r>
-            <a:r>
-              <a:rPr lang="en-ZA" dirty="0" smtClean="0"/>
-              <a:t>found:</a:t>
+              <a:t>Once component is found:</a:t>
             </a:r>
           </a:p>
           <a:p>
@@ -3648,15 +3717,7 @@
             </a:pPr>
             <a:r>
               <a:rPr lang="en-ZA" dirty="0" smtClean="0"/>
-              <a:t>Find centre of bin – this is dominant angle – angle of bin – </a:t>
-            </a:r>
-            <a:r>
-              <a:rPr lang="en-ZA" dirty="0" smtClean="0"/>
-              <a:t>angle </a:t>
-            </a:r>
-            <a:r>
-              <a:rPr lang="en-ZA" dirty="0" smtClean="0"/>
-              <a:t>of all the pixels inside bin</a:t>
+              <a:t>Find centre of bin – this is dominant angle – angle of bin – angle of all the pixels inside bin</a:t>
             </a:r>
           </a:p>
           <a:p>
@@ -3676,15 +3737,7 @@
             </a:pPr>
             <a:r>
               <a:rPr lang="en-ZA" dirty="0" smtClean="0"/>
-              <a:t>Does plotted coloured pixels give </a:t>
-            </a:r>
-            <a:r>
-              <a:rPr lang="en-ZA" dirty="0" smtClean="0"/>
-              <a:t>components entire </a:t>
-            </a:r>
-            <a:r>
-              <a:rPr lang="en-ZA" dirty="0" smtClean="0"/>
-              <a:t>edge?</a:t>
+              <a:t>Does plotted coloured pixels give components entire edge?</a:t>
             </a:r>
           </a:p>
           <a:p>
@@ -3704,15 +3757,7 @@
             </a:pPr>
             <a:r>
               <a:rPr lang="en-ZA" dirty="0" smtClean="0"/>
-              <a:t>If yes, this bin’s orientation is  </a:t>
-            </a:r>
-            <a:r>
-              <a:rPr lang="en-ZA" dirty="0" smtClean="0"/>
-              <a:t>the discovered </a:t>
-            </a:r>
-            <a:r>
-              <a:rPr lang="en-ZA" dirty="0" smtClean="0"/>
-              <a:t>dominant angle</a:t>
+              <a:t>If yes, this bin’s orientation is  the discovered dominant angle</a:t>
             </a:r>
           </a:p>
           <a:p>
@@ -3744,7 +3789,7 @@
 </p:sld>
 </file>
 
-<file path=ppt/slides/slide6.xml><?xml version="1.0" encoding="utf-8"?>
+<file path=ppt/slides/slide7.xml><?xml version="1.0" encoding="utf-8"?>
 <p:sld xmlns:a="http://schemas.openxmlformats.org/drawingml/2006/main" xmlns:r="http://schemas.openxmlformats.org/officeDocument/2006/relationships" xmlns:p="http://schemas.openxmlformats.org/presentationml/2006/main">
   <p:cSld>
     <p:spTree>

</xml_diff>

<commit_message>
ConnectComponent03: I am calculating angles of mask and not original grayscale image/ Maybe this could be the reason that my plotting back to original do not line up.
MyEdgeDetector:
Reworking on drawing profiles and plotting them.
</commit_message>
<xml_diff>
--- a/ConsoleApplication5/20170118_POA.pptx
+++ b/ConsoleApplication5/20170118_POA.pptx
@@ -12,6 +12,8 @@
     <p:sldId id="259" r:id="rId6"/>
     <p:sldId id="260" r:id="rId7"/>
     <p:sldId id="261" r:id="rId8"/>
+    <p:sldId id="263" r:id="rId9"/>
+    <p:sldId id="264" r:id="rId10"/>
   </p:sldIdLst>
   <p:sldSz cx="9144000" cy="6858000" type="screen4x3"/>
   <p:notesSz cx="6858000" cy="9144000"/>
@@ -294,7 +296,7 @@
           <a:p>
             <a:fld id="{F336AD1D-019F-4E13-8E2B-E0830EF1CB0D}" type="datetimeFigureOut">
               <a:rPr lang="en-ZA" smtClean="0"/>
-              <a:t>2017/01/21</a:t>
+              <a:t>2017/01/24</a:t>
             </a:fld>
             <a:endParaRPr lang="en-ZA"/>
           </a:p>
@@ -464,7 +466,7 @@
           <a:p>
             <a:fld id="{F336AD1D-019F-4E13-8E2B-E0830EF1CB0D}" type="datetimeFigureOut">
               <a:rPr lang="en-ZA" smtClean="0"/>
-              <a:t>2017/01/21</a:t>
+              <a:t>2017/01/24</a:t>
             </a:fld>
             <a:endParaRPr lang="en-ZA"/>
           </a:p>
@@ -644,7 +646,7 @@
           <a:p>
             <a:fld id="{F336AD1D-019F-4E13-8E2B-E0830EF1CB0D}" type="datetimeFigureOut">
               <a:rPr lang="en-ZA" smtClean="0"/>
-              <a:t>2017/01/21</a:t>
+              <a:t>2017/01/24</a:t>
             </a:fld>
             <a:endParaRPr lang="en-ZA"/>
           </a:p>
@@ -814,7 +816,7 @@
           <a:p>
             <a:fld id="{F336AD1D-019F-4E13-8E2B-E0830EF1CB0D}" type="datetimeFigureOut">
               <a:rPr lang="en-ZA" smtClean="0"/>
-              <a:t>2017/01/21</a:t>
+              <a:t>2017/01/24</a:t>
             </a:fld>
             <a:endParaRPr lang="en-ZA"/>
           </a:p>
@@ -1060,7 +1062,7 @@
           <a:p>
             <a:fld id="{F336AD1D-019F-4E13-8E2B-E0830EF1CB0D}" type="datetimeFigureOut">
               <a:rPr lang="en-ZA" smtClean="0"/>
-              <a:t>2017/01/21</a:t>
+              <a:t>2017/01/24</a:t>
             </a:fld>
             <a:endParaRPr lang="en-ZA"/>
           </a:p>
@@ -1348,7 +1350,7 @@
           <a:p>
             <a:fld id="{F336AD1D-019F-4E13-8E2B-E0830EF1CB0D}" type="datetimeFigureOut">
               <a:rPr lang="en-ZA" smtClean="0"/>
-              <a:t>2017/01/21</a:t>
+              <a:t>2017/01/24</a:t>
             </a:fld>
             <a:endParaRPr lang="en-ZA"/>
           </a:p>
@@ -1770,7 +1772,7 @@
           <a:p>
             <a:fld id="{F336AD1D-019F-4E13-8E2B-E0830EF1CB0D}" type="datetimeFigureOut">
               <a:rPr lang="en-ZA" smtClean="0"/>
-              <a:t>2017/01/21</a:t>
+              <a:t>2017/01/24</a:t>
             </a:fld>
             <a:endParaRPr lang="en-ZA"/>
           </a:p>
@@ -1888,7 +1890,7 @@
           <a:p>
             <a:fld id="{F336AD1D-019F-4E13-8E2B-E0830EF1CB0D}" type="datetimeFigureOut">
               <a:rPr lang="en-ZA" smtClean="0"/>
-              <a:t>2017/01/21</a:t>
+              <a:t>2017/01/24</a:t>
             </a:fld>
             <a:endParaRPr lang="en-ZA"/>
           </a:p>
@@ -1983,7 +1985,7 @@
           <a:p>
             <a:fld id="{F336AD1D-019F-4E13-8E2B-E0830EF1CB0D}" type="datetimeFigureOut">
               <a:rPr lang="en-ZA" smtClean="0"/>
-              <a:t>2017/01/21</a:t>
+              <a:t>2017/01/24</a:t>
             </a:fld>
             <a:endParaRPr lang="en-ZA"/>
           </a:p>
@@ -2260,7 +2262,7 @@
           <a:p>
             <a:fld id="{F336AD1D-019F-4E13-8E2B-E0830EF1CB0D}" type="datetimeFigureOut">
               <a:rPr lang="en-ZA" smtClean="0"/>
-              <a:t>2017/01/21</a:t>
+              <a:t>2017/01/24</a:t>
             </a:fld>
             <a:endParaRPr lang="en-ZA"/>
           </a:p>
@@ -2513,7 +2515,7 @@
           <a:p>
             <a:fld id="{F336AD1D-019F-4E13-8E2B-E0830EF1CB0D}" type="datetimeFigureOut">
               <a:rPr lang="en-ZA" smtClean="0"/>
-              <a:t>2017/01/21</a:t>
+              <a:t>2017/01/24</a:t>
             </a:fld>
             <a:endParaRPr lang="en-ZA"/>
           </a:p>
@@ -2726,7 +2728,7 @@
           <a:p>
             <a:fld id="{F336AD1D-019F-4E13-8E2B-E0830EF1CB0D}" type="datetimeFigureOut">
               <a:rPr lang="en-ZA" smtClean="0"/>
-              <a:t>2017/01/21</a:t>
+              <a:t>2017/01/24</a:t>
             </a:fld>
             <a:endParaRPr lang="en-ZA"/>
           </a:p>
@@ -3913,6 +3915,197 @@
     <p:extLst>
       <p:ext uri="{BB962C8B-B14F-4D97-AF65-F5344CB8AC3E}">
         <p14:creationId xmlns:p14="http://schemas.microsoft.com/office/powerpoint/2010/main" val="1027214350"/>
+      </p:ext>
+    </p:extLst>
+  </p:cSld>
+  <p:clrMapOvr>
+    <a:masterClrMapping/>
+  </p:clrMapOvr>
+</p:sld>
+</file>
+
+<file path=ppt/slides/slide8.xml><?xml version="1.0" encoding="utf-8"?>
+<p:sld xmlns:a="http://schemas.openxmlformats.org/drawingml/2006/main" xmlns:r="http://schemas.openxmlformats.org/officeDocument/2006/relationships" xmlns:p="http://schemas.openxmlformats.org/presentationml/2006/main">
+  <p:cSld>
+    <p:spTree>
+      <p:nvGrpSpPr>
+        <p:cNvPr id="1" name=""/>
+        <p:cNvGrpSpPr/>
+        <p:nvPr/>
+      </p:nvGrpSpPr>
+      <p:grpSpPr>
+        <a:xfrm>
+          <a:off x="0" y="0"/>
+          <a:ext cx="0" cy="0"/>
+          <a:chOff x="0" y="0"/>
+          <a:chExt cx="0" cy="0"/>
+        </a:xfrm>
+      </p:grpSpPr>
+      <p:sp>
+        <p:nvSpPr>
+          <p:cNvPr id="2" name="Title 1"/>
+          <p:cNvSpPr>
+            <a:spLocks noGrp="1"/>
+          </p:cNvSpPr>
+          <p:nvPr>
+            <p:ph type="title"/>
+          </p:nvPr>
+        </p:nvSpPr>
+        <p:spPr/>
+        <p:txBody>
+          <a:bodyPr/>
+          <a:lstStyle/>
+          <a:p>
+            <a:r>
+              <a:rPr lang="en-ZA" dirty="0" smtClean="0"/>
+              <a:t>Profiling</a:t>
+            </a:r>
+            <a:endParaRPr lang="en-ZA" dirty="0"/>
+          </a:p>
+        </p:txBody>
+      </p:sp>
+      <p:sp>
+        <p:nvSpPr>
+          <p:cNvPr id="3" name="Content Placeholder 2"/>
+          <p:cNvSpPr>
+            <a:spLocks noGrp="1"/>
+          </p:cNvSpPr>
+          <p:nvPr>
+            <p:ph idx="1"/>
+          </p:nvPr>
+        </p:nvSpPr>
+        <p:spPr/>
+        <p:txBody>
+          <a:bodyPr/>
+          <a:lstStyle/>
+          <a:p>
+            <a:r>
+              <a:rPr lang="en-ZA" dirty="0" smtClean="0"/>
+              <a:t>Profiling on grayscale image</a:t>
+            </a:r>
+          </a:p>
+          <a:p>
+            <a:r>
+              <a:rPr lang="en-ZA" dirty="0" smtClean="0"/>
+              <a:t>Profile found components</a:t>
+            </a:r>
+          </a:p>
+          <a:p>
+            <a:r>
+              <a:rPr lang="en-ZA" dirty="0" smtClean="0"/>
+              <a:t>Due to shape of ripple </a:t>
+            </a:r>
+            <a:r>
+              <a:rPr lang="en-ZA" dirty="0" err="1" smtClean="0"/>
+              <a:t>highlights+shadows</a:t>
+            </a:r>
+            <a:r>
+              <a:rPr lang="en-ZA" dirty="0" smtClean="0"/>
+              <a:t>, profile can tell if component is ripple</a:t>
+            </a:r>
+            <a:endParaRPr lang="en-ZA" dirty="0"/>
+          </a:p>
+        </p:txBody>
+      </p:sp>
+    </p:spTree>
+    <p:extLst>
+      <p:ext uri="{BB962C8B-B14F-4D97-AF65-F5344CB8AC3E}">
+        <p14:creationId xmlns:p14="http://schemas.microsoft.com/office/powerpoint/2010/main" val="1847232142"/>
+      </p:ext>
+    </p:extLst>
+  </p:cSld>
+  <p:clrMapOvr>
+    <a:masterClrMapping/>
+  </p:clrMapOvr>
+</p:sld>
+</file>
+
+<file path=ppt/slides/slide9.xml><?xml version="1.0" encoding="utf-8"?>
+<p:sld xmlns:a="http://schemas.openxmlformats.org/drawingml/2006/main" xmlns:r="http://schemas.openxmlformats.org/officeDocument/2006/relationships" xmlns:p="http://schemas.openxmlformats.org/presentationml/2006/main">
+  <p:cSld>
+    <p:spTree>
+      <p:nvGrpSpPr>
+        <p:cNvPr id="1" name=""/>
+        <p:cNvGrpSpPr/>
+        <p:nvPr/>
+      </p:nvGrpSpPr>
+      <p:grpSpPr>
+        <a:xfrm>
+          <a:off x="0" y="0"/>
+          <a:ext cx="0" cy="0"/>
+          <a:chOff x="0" y="0"/>
+          <a:chExt cx="0" cy="0"/>
+        </a:xfrm>
+      </p:grpSpPr>
+      <p:sp>
+        <p:nvSpPr>
+          <p:cNvPr id="2" name="Title 1"/>
+          <p:cNvSpPr>
+            <a:spLocks noGrp="1"/>
+          </p:cNvSpPr>
+          <p:nvPr>
+            <p:ph type="title"/>
+          </p:nvPr>
+        </p:nvSpPr>
+        <p:spPr/>
+        <p:txBody>
+          <a:bodyPr/>
+          <a:lstStyle/>
+          <a:p>
+            <a:r>
+              <a:rPr lang="en-ZA" dirty="0" smtClean="0"/>
+              <a:t>Angle Histogram Analysis (AHA)</a:t>
+            </a:r>
+            <a:endParaRPr lang="en-ZA" dirty="0"/>
+          </a:p>
+        </p:txBody>
+      </p:sp>
+      <p:sp>
+        <p:nvSpPr>
+          <p:cNvPr id="3" name="Content Placeholder 2"/>
+          <p:cNvSpPr>
+            <a:spLocks noGrp="1"/>
+          </p:cNvSpPr>
+          <p:nvPr>
+            <p:ph idx="1"/>
+          </p:nvPr>
+        </p:nvSpPr>
+        <p:spPr/>
+        <p:txBody>
+          <a:bodyPr/>
+          <a:lstStyle/>
+          <a:p>
+            <a:r>
+              <a:rPr lang="en-ZA" dirty="0" smtClean="0"/>
+              <a:t>Since ripples are clustered</a:t>
+            </a:r>
+          </a:p>
+          <a:p>
+            <a:r>
+              <a:rPr lang="en-ZA" dirty="0" smtClean="0"/>
+              <a:t>Ripple clusters have a common angle</a:t>
+            </a:r>
+          </a:p>
+          <a:p>
+            <a:r>
+              <a:rPr lang="en-ZA" dirty="0" smtClean="0"/>
+              <a:t>AHA is another test, to check </a:t>
+            </a:r>
+            <a:r>
+              <a:rPr lang="en-ZA" smtClean="0"/>
+              <a:t>if components are ripples</a:t>
+            </a:r>
+            <a:endParaRPr lang="en-ZA" dirty="0" smtClean="0"/>
+          </a:p>
+          <a:p>
+            <a:endParaRPr lang="en-ZA" dirty="0"/>
+          </a:p>
+        </p:txBody>
+      </p:sp>
+    </p:spTree>
+    <p:extLst>
+      <p:ext uri="{BB962C8B-B14F-4D97-AF65-F5344CB8AC3E}">
+        <p14:creationId xmlns:p14="http://schemas.microsoft.com/office/powerpoint/2010/main" val="654219439"/>
       </p:ext>
     </p:extLst>
   </p:cSld>

</xml_diff>